<commit_message>
Presentation with additional information about the motes, however the Network side of things still has to be defined in the document
</commit_message>
<xml_diff>
--- a/kick_off_presentation/Presentation_kick_off.pptx
+++ b/kick_off_presentation/Presentation_kick_off.pptx
@@ -17,6 +17,7 @@
     <p:sldId id="260" r:id="rId10"/>
     <p:sldId id="261" r:id="rId11"/>
     <p:sldId id="262" r:id="rId12"/>
+    <p:sldId id="263" r:id="rId13"/>
   </p:sldIdLst>
   <p:sldSz cx="9144000" cy="6858000"/>
   <p:notesSz cx="6858000" cy="9144000"/>
@@ -247,7 +248,7 @@
           </a:bodyPr>
           <a:p>
             <a:pPr algn="r"/>
-            <a:fld id="{772908B5-D57F-4A10-A25F-E8EF9BA5D70A}" type="slidenum">
+            <a:fld id="{DEBC7B25-BD34-49C1-8584-05DE50D9DB27}" type="slidenum">
               <a:rPr b="0" lang="en-US" sz="1400" spc="-1" strike="noStrike">
                 <a:latin typeface="Nimbus Roman"/>
               </a:rPr>
@@ -284,7 +285,7 @@
       </p:grpSpPr>
       <p:sp>
         <p:nvSpPr>
-          <p:cNvPr id="150" name="PlaceHolder 1"/>
+          <p:cNvPr id="154" name="PlaceHolder 1"/>
           <p:cNvSpPr>
             <a:spLocks noGrp="1"/>
           </p:cNvSpPr>
@@ -304,7 +305,7 @@
       </p:sp>
       <p:sp>
         <p:nvSpPr>
-          <p:cNvPr id="151" name="PlaceHolder 2"/>
+          <p:cNvPr id="155" name="PlaceHolder 2"/>
           <p:cNvSpPr>
             <a:spLocks noGrp="1"/>
           </p:cNvSpPr>
@@ -334,7 +335,7 @@
       </p:sp>
       <p:sp>
         <p:nvSpPr>
-          <p:cNvPr id="152" name="CustomShape 3"/>
+          <p:cNvPr id="156" name="CustomShape 3"/>
           <p:cNvSpPr/>
           <p:nvPr/>
         </p:nvSpPr>
@@ -367,130 +368,7 @@
                 <a:spcPct val="100000"/>
               </a:lnSpc>
             </a:pPr>
-            <a:fld id="{99340385-074D-4D80-AAB1-8CEA68E78BD0}" type="slidenum">
-              <a:rPr b="0" lang="en-US" sz="1200" spc="-1" strike="noStrike">
-                <a:solidFill>
-                  <a:srgbClr val="000000"/>
-                </a:solidFill>
-                <a:latin typeface="+mn-lt"/>
-                <a:ea typeface="+mn-ea"/>
-              </a:rPr>
-              <a:t>&lt;number&gt;</a:t>
-            </a:fld>
-            <a:endParaRPr b="0" lang="en-US" sz="1200" spc="-1" strike="noStrike">
-              <a:latin typeface="Nimbus Sans"/>
-            </a:endParaRPr>
-          </a:p>
-        </p:txBody>
-      </p:sp>
-    </p:spTree>
-  </p:cSld>
-</p:notes>
-</file>
-
-<file path=ppt/notesSlides/notesSlide6.xml><?xml version="1.0" encoding="utf-8"?>
-<p:notes xmlns:a="http://schemas.openxmlformats.org/drawingml/2006/main" xmlns:p="http://schemas.openxmlformats.org/presentationml/2006/main" xmlns:r="http://schemas.openxmlformats.org/officeDocument/2006/relationships" xmlns:p14="http://schemas.microsoft.com/office/powerpoint/2010/main" xmlns:p15="http://schemas.microsoft.com/office/powerpoint/2012/main" xmlns:mc="http://schemas.openxmlformats.org/markup-compatibility/2006">
-  <p:cSld>
-    <p:spTree>
-      <p:nvGrpSpPr>
-        <p:cNvPr id="1" name=""/>
-        <p:cNvGrpSpPr/>
-        <p:nvPr/>
-      </p:nvGrpSpPr>
-      <p:grpSpPr>
-        <a:xfrm>
-          <a:off x="0" y="0"/>
-          <a:ext cx="0" cy="0"/>
-          <a:chOff x="0" y="0"/>
-          <a:chExt cx="0" cy="0"/>
-        </a:xfrm>
-      </p:grpSpPr>
-      <p:sp>
-        <p:nvSpPr>
-          <p:cNvPr id="153" name="PlaceHolder 1"/>
-          <p:cNvSpPr>
-            <a:spLocks noGrp="1"/>
-          </p:cNvSpPr>
-          <p:nvPr>
-            <p:ph type="sldImg"/>
-          </p:nvPr>
-        </p:nvSpPr>
-        <p:spPr>
-          <a:xfrm>
-            <a:off x="1143000" y="685800"/>
-            <a:ext cx="4571280" cy="3428280"/>
-          </a:xfrm>
-          <a:prstGeom prst="rect">
-            <a:avLst/>
-          </a:prstGeom>
-        </p:spPr>
-      </p:sp>
-      <p:sp>
-        <p:nvSpPr>
-          <p:cNvPr id="154" name="PlaceHolder 2"/>
-          <p:cNvSpPr>
-            <a:spLocks noGrp="1"/>
-          </p:cNvSpPr>
-          <p:nvPr>
-            <p:ph type="body"/>
-          </p:nvPr>
-        </p:nvSpPr>
-        <p:spPr>
-          <a:xfrm>
-            <a:off x="685800" y="4343400"/>
-            <a:ext cx="5485680" cy="4114080"/>
-          </a:xfrm>
-          <a:prstGeom prst="rect">
-            <a:avLst/>
-          </a:prstGeom>
-        </p:spPr>
-        <p:txBody>
-          <a:bodyPr lIns="0" rIns="0" tIns="0" bIns="0">
-            <a:noAutofit/>
-          </a:bodyPr>
-          <a:p>
-            <a:endParaRPr b="0" lang="en-US" sz="2000" spc="-1" strike="noStrike">
-              <a:latin typeface="Nimbus Sans"/>
-            </a:endParaRPr>
-          </a:p>
-        </p:txBody>
-      </p:sp>
-      <p:sp>
-        <p:nvSpPr>
-          <p:cNvPr id="155" name="CustomShape 3"/>
-          <p:cNvSpPr/>
-          <p:nvPr/>
-        </p:nvSpPr>
-        <p:spPr>
-          <a:xfrm>
-            <a:off x="3884760" y="8685360"/>
-            <a:ext cx="2971080" cy="456480"/>
-          </a:xfrm>
-          <a:prstGeom prst="rect">
-            <a:avLst/>
-          </a:prstGeom>
-          <a:noFill/>
-          <a:ln>
-            <a:noFill/>
-          </a:ln>
-        </p:spPr>
-        <p:style>
-          <a:lnRef idx="0"/>
-          <a:fillRef idx="0"/>
-          <a:effectRef idx="0"/>
-          <a:fontRef idx="minor"/>
-        </p:style>
-        <p:txBody>
-          <a:bodyPr lIns="90000" rIns="90000" tIns="45000" bIns="45000" anchor="b">
-            <a:noAutofit/>
-          </a:bodyPr>
-          <a:p>
-            <a:pPr algn="r">
-              <a:lnSpc>
-                <a:spcPct val="100000"/>
-              </a:lnSpc>
-            </a:pPr>
-            <a:fld id="{6A0CC782-267C-44DB-87E8-B5D53283F7C6}" type="slidenum">
+            <a:fld id="{0CAC58FD-2411-459E-ADF8-8EC54312C58C}" type="slidenum">
               <a:rPr b="0" lang="en-US" sz="1200" spc="-1" strike="noStrike">
                 <a:solidFill>
                   <a:srgbClr val="000000"/>
@@ -530,7 +408,7 @@
       </p:grpSpPr>
       <p:sp>
         <p:nvSpPr>
-          <p:cNvPr id="156" name="PlaceHolder 1"/>
+          <p:cNvPr id="157" name="PlaceHolder 1"/>
           <p:cNvSpPr>
             <a:spLocks noGrp="1"/>
           </p:cNvSpPr>
@@ -550,7 +428,7 @@
       </p:sp>
       <p:sp>
         <p:nvSpPr>
-          <p:cNvPr id="157" name="PlaceHolder 2"/>
+          <p:cNvPr id="158" name="PlaceHolder 2"/>
           <p:cNvSpPr>
             <a:spLocks noGrp="1"/>
           </p:cNvSpPr>
@@ -580,7 +458,7 @@
       </p:sp>
       <p:sp>
         <p:nvSpPr>
-          <p:cNvPr id="158" name="CustomShape 3"/>
+          <p:cNvPr id="159" name="CustomShape 3"/>
           <p:cNvSpPr/>
           <p:nvPr/>
         </p:nvSpPr>
@@ -613,7 +491,130 @@
                 <a:spcPct val="100000"/>
               </a:lnSpc>
             </a:pPr>
-            <a:fld id="{12F6712E-7263-48F6-9539-E3A46014943C}" type="slidenum">
+            <a:fld id="{8731503A-B4FE-4ADC-AEB0-6F3083ABECE8}" type="slidenum">
+              <a:rPr b="0" lang="en-US" sz="1200" spc="-1" strike="noStrike">
+                <a:solidFill>
+                  <a:srgbClr val="000000"/>
+                </a:solidFill>
+                <a:latin typeface="+mn-lt"/>
+                <a:ea typeface="+mn-ea"/>
+              </a:rPr>
+              <a:t>&lt;number&gt;</a:t>
+            </a:fld>
+            <a:endParaRPr b="0" lang="en-US" sz="1200" spc="-1" strike="noStrike">
+              <a:latin typeface="Nimbus Sans"/>
+            </a:endParaRPr>
+          </a:p>
+        </p:txBody>
+      </p:sp>
+    </p:spTree>
+  </p:cSld>
+</p:notes>
+</file>
+
+<file path=ppt/notesSlides/notesSlide8.xml><?xml version="1.0" encoding="utf-8"?>
+<p:notes xmlns:a="http://schemas.openxmlformats.org/drawingml/2006/main" xmlns:p="http://schemas.openxmlformats.org/presentationml/2006/main" xmlns:r="http://schemas.openxmlformats.org/officeDocument/2006/relationships" xmlns:p14="http://schemas.microsoft.com/office/powerpoint/2010/main" xmlns:p15="http://schemas.microsoft.com/office/powerpoint/2012/main" xmlns:mc="http://schemas.openxmlformats.org/markup-compatibility/2006">
+  <p:cSld>
+    <p:spTree>
+      <p:nvGrpSpPr>
+        <p:cNvPr id="1" name=""/>
+        <p:cNvGrpSpPr/>
+        <p:nvPr/>
+      </p:nvGrpSpPr>
+      <p:grpSpPr>
+        <a:xfrm>
+          <a:off x="0" y="0"/>
+          <a:ext cx="0" cy="0"/>
+          <a:chOff x="0" y="0"/>
+          <a:chExt cx="0" cy="0"/>
+        </a:xfrm>
+      </p:grpSpPr>
+      <p:sp>
+        <p:nvSpPr>
+          <p:cNvPr id="160" name="PlaceHolder 1"/>
+          <p:cNvSpPr>
+            <a:spLocks noGrp="1"/>
+          </p:cNvSpPr>
+          <p:nvPr>
+            <p:ph type="sldImg"/>
+          </p:nvPr>
+        </p:nvSpPr>
+        <p:spPr>
+          <a:xfrm>
+            <a:off x="1143000" y="685800"/>
+            <a:ext cx="4571280" cy="3428280"/>
+          </a:xfrm>
+          <a:prstGeom prst="rect">
+            <a:avLst/>
+          </a:prstGeom>
+        </p:spPr>
+      </p:sp>
+      <p:sp>
+        <p:nvSpPr>
+          <p:cNvPr id="161" name="PlaceHolder 2"/>
+          <p:cNvSpPr>
+            <a:spLocks noGrp="1"/>
+          </p:cNvSpPr>
+          <p:nvPr>
+            <p:ph type="body"/>
+          </p:nvPr>
+        </p:nvSpPr>
+        <p:spPr>
+          <a:xfrm>
+            <a:off x="685800" y="4343400"/>
+            <a:ext cx="5485680" cy="4114080"/>
+          </a:xfrm>
+          <a:prstGeom prst="rect">
+            <a:avLst/>
+          </a:prstGeom>
+        </p:spPr>
+        <p:txBody>
+          <a:bodyPr lIns="0" rIns="0" tIns="0" bIns="0">
+            <a:noAutofit/>
+          </a:bodyPr>
+          <a:p>
+            <a:endParaRPr b="0" lang="en-US" sz="2000" spc="-1" strike="noStrike">
+              <a:latin typeface="Nimbus Sans"/>
+            </a:endParaRPr>
+          </a:p>
+        </p:txBody>
+      </p:sp>
+      <p:sp>
+        <p:nvSpPr>
+          <p:cNvPr id="162" name="CustomShape 3"/>
+          <p:cNvSpPr/>
+          <p:nvPr/>
+        </p:nvSpPr>
+        <p:spPr>
+          <a:xfrm>
+            <a:off x="3884760" y="8685360"/>
+            <a:ext cx="2971080" cy="456480"/>
+          </a:xfrm>
+          <a:prstGeom prst="rect">
+            <a:avLst/>
+          </a:prstGeom>
+          <a:noFill/>
+          <a:ln>
+            <a:noFill/>
+          </a:ln>
+        </p:spPr>
+        <p:style>
+          <a:lnRef idx="0"/>
+          <a:fillRef idx="0"/>
+          <a:effectRef idx="0"/>
+          <a:fontRef idx="minor"/>
+        </p:style>
+        <p:txBody>
+          <a:bodyPr lIns="90000" rIns="90000" tIns="45000" bIns="45000" anchor="b">
+            <a:noAutofit/>
+          </a:bodyPr>
+          <a:p>
+            <a:pPr algn="r">
+              <a:lnSpc>
+                <a:spcPct val="100000"/>
+              </a:lnSpc>
+            </a:pPr>
+            <a:fld id="{5F5952E2-4115-4009-8D56-A6B24CFAFB64}" type="slidenum">
               <a:rPr b="0" lang="en-US" sz="1200" spc="-1" strike="noStrike">
                 <a:solidFill>
                   <a:srgbClr val="000000"/>
@@ -4966,151 +4967,7 @@
               <a:rPr b="0" lang="en-US" sz="4400" spc="-1" strike="noStrike">
                 <a:latin typeface="Nimbus Sans"/>
               </a:rPr>
-              <a:t>C</a:t>
-            </a:r>
-            <a:r>
-              <a:rPr b="0" lang="en-US" sz="4400" spc="-1" strike="noStrike">
-                <a:latin typeface="Nimbus Sans"/>
-              </a:rPr>
-              <a:t>li</a:t>
-            </a:r>
-            <a:r>
-              <a:rPr b="0" lang="en-US" sz="4400" spc="-1" strike="noStrike">
-                <a:latin typeface="Nimbus Sans"/>
-              </a:rPr>
-              <a:t>c</a:t>
-            </a:r>
-            <a:r>
-              <a:rPr b="0" lang="en-US" sz="4400" spc="-1" strike="noStrike">
-                <a:latin typeface="Nimbus Sans"/>
-              </a:rPr>
-              <a:t>k </a:t>
-            </a:r>
-            <a:r>
-              <a:rPr b="0" lang="en-US" sz="4400" spc="-1" strike="noStrike">
-                <a:latin typeface="Nimbus Sans"/>
-              </a:rPr>
-              <a:t>t</a:t>
-            </a:r>
-            <a:r>
-              <a:rPr b="0" lang="en-US" sz="4400" spc="-1" strike="noStrike">
-                <a:latin typeface="Nimbus Sans"/>
-              </a:rPr>
-              <a:t>o </a:t>
-            </a:r>
-            <a:r>
-              <a:rPr b="0" lang="en-US" sz="4400" spc="-1" strike="noStrike">
-                <a:latin typeface="Nimbus Sans"/>
-              </a:rPr>
-              <a:t>e</a:t>
-            </a:r>
-            <a:r>
-              <a:rPr b="0" lang="en-US" sz="4400" spc="-1" strike="noStrike">
-                <a:latin typeface="Nimbus Sans"/>
-              </a:rPr>
-              <a:t>d</a:t>
-            </a:r>
-            <a:r>
-              <a:rPr b="0" lang="en-US" sz="4400" spc="-1" strike="noStrike">
-                <a:latin typeface="Nimbus Sans"/>
-              </a:rPr>
-              <a:t>it </a:t>
-            </a:r>
-            <a:r>
-              <a:rPr b="0" lang="en-US" sz="4400" spc="-1" strike="noStrike">
-                <a:latin typeface="Nimbus Sans"/>
-              </a:rPr>
-              <a:t>t</a:t>
-            </a:r>
-            <a:r>
-              <a:rPr b="0" lang="en-US" sz="4400" spc="-1" strike="noStrike">
-                <a:latin typeface="Nimbus Sans"/>
-              </a:rPr>
-              <a:t>h</a:t>
-            </a:r>
-            <a:r>
-              <a:rPr b="0" lang="en-US" sz="4400" spc="-1" strike="noStrike">
-                <a:latin typeface="Nimbus Sans"/>
-              </a:rPr>
-              <a:t>e </a:t>
-            </a:r>
-            <a:r>
-              <a:rPr b="0" lang="en-US" sz="4400" spc="-1" strike="noStrike">
-                <a:latin typeface="Nimbus Sans"/>
-              </a:rPr>
-              <a:t>ti</a:t>
-            </a:r>
-            <a:r>
-              <a:rPr b="0" lang="en-US" sz="4400" spc="-1" strike="noStrike">
-                <a:latin typeface="Nimbus Sans"/>
-              </a:rPr>
-              <a:t>tl</a:t>
-            </a:r>
-            <a:r>
-              <a:rPr b="0" lang="en-US" sz="4400" spc="-1" strike="noStrike">
-                <a:latin typeface="Nimbus Sans"/>
-              </a:rPr>
-              <a:t>e </a:t>
-            </a:r>
-            <a:r>
-              <a:rPr b="0" lang="en-US" sz="4400" spc="-1" strike="noStrike">
-                <a:latin typeface="Nimbus Sans"/>
-              </a:rPr>
-              <a:t>t</a:t>
-            </a:r>
-            <a:r>
-              <a:rPr b="0" lang="en-US" sz="4400" spc="-1" strike="noStrike">
-                <a:latin typeface="Nimbus Sans"/>
-              </a:rPr>
-              <a:t>e</a:t>
-            </a:r>
-            <a:r>
-              <a:rPr b="0" lang="en-US" sz="4400" spc="-1" strike="noStrike">
-                <a:latin typeface="Nimbus Sans"/>
-              </a:rPr>
-              <a:t>x</a:t>
-            </a:r>
-            <a:r>
-              <a:rPr b="0" lang="en-US" sz="4400" spc="-1" strike="noStrike">
-                <a:latin typeface="Nimbus Sans"/>
-              </a:rPr>
-              <a:t>t </a:t>
-            </a:r>
-            <a:r>
-              <a:rPr b="0" lang="en-US" sz="4400" spc="-1" strike="noStrike">
-                <a:latin typeface="Nimbus Sans"/>
-              </a:rPr>
-              <a:t>f</a:t>
-            </a:r>
-            <a:r>
-              <a:rPr b="0" lang="en-US" sz="4400" spc="-1" strike="noStrike">
-                <a:latin typeface="Nimbus Sans"/>
-              </a:rPr>
-              <a:t>o</a:t>
-            </a:r>
-            <a:r>
-              <a:rPr b="0" lang="en-US" sz="4400" spc="-1" strike="noStrike">
-                <a:latin typeface="Nimbus Sans"/>
-              </a:rPr>
-              <a:t>r</a:t>
-            </a:r>
-            <a:r>
-              <a:rPr b="0" lang="en-US" sz="4400" spc="-1" strike="noStrike">
-                <a:latin typeface="Nimbus Sans"/>
-              </a:rPr>
-              <a:t>m</a:t>
-            </a:r>
-            <a:r>
-              <a:rPr b="0" lang="en-US" sz="4400" spc="-1" strike="noStrike">
-                <a:latin typeface="Nimbus Sans"/>
-              </a:rPr>
-              <a:t>a</a:t>
-            </a:r>
-            <a:r>
-              <a:rPr b="0" lang="en-US" sz="4400" spc="-1" strike="noStrike">
-                <a:latin typeface="Nimbus Sans"/>
-              </a:rPr>
-              <a:t>t</a:t>
+              <a:t>Click to edit the title text format</a:t>
             </a:r>
             <a:endParaRPr b="0" lang="en-US" sz="4400" spc="-1" strike="noStrike">
               <a:latin typeface="Nimbus Sans"/>
@@ -6386,7 +6243,7 @@
                 <a:spcPct val="100000"/>
               </a:lnSpc>
             </a:pPr>
-            <a:fld id="{AFA8C024-1934-4F7E-8482-BD0678401D9F}" type="slidenum">
+            <a:fld id="{7C2F2895-87EB-4BFF-BC46-2A0C360722E9}" type="slidenum">
               <a:rPr b="0" lang="en-US" sz="1200" spc="-1" strike="noStrike">
                 <a:solidFill>
                   <a:srgbClr val="000000"/>
@@ -6524,7 +6381,7 @@
                 </a:solidFill>
                 <a:latin typeface="Arial"/>
               </a:rPr>
-              <a:t>A major problem with solar panels is to track the sun in 2-axis</a:t>
+              <a:t>A major problem with solar panels is to track the motion of the sun in 2-axis</a:t>
             </a:r>
             <a:endParaRPr b="0" lang="en-US" sz="2000" spc="-1" strike="noStrike">
               <a:latin typeface="Nimbus Sans"/>
@@ -6549,7 +6406,7 @@
                 </a:solidFill>
                 <a:latin typeface="Arial"/>
               </a:rPr>
-              <a:t>One during the day from East to west</a:t>
+              <a:t>One during the day from East to West</a:t>
             </a:r>
             <a:endParaRPr b="0" lang="en-US" sz="2000" spc="-1" strike="noStrike">
               <a:latin typeface="Nimbus Sans"/>
@@ -6574,7 +6431,7 @@
                 </a:solidFill>
                 <a:latin typeface="Arial"/>
               </a:rPr>
-              <a:t>One to change during the months</a:t>
+              <a:t>One during the months from North to South</a:t>
             </a:r>
             <a:endParaRPr b="0" lang="en-US" sz="2000" spc="-1" strike="noStrike">
               <a:latin typeface="Nimbus Sans"/>
@@ -6876,7 +6733,7 @@
         <p:spPr>
           <a:xfrm>
             <a:off x="358920" y="1266120"/>
-            <a:ext cx="8421120" cy="5000760"/>
+            <a:ext cx="8421120" cy="1659960"/>
           </a:xfrm>
           <a:prstGeom prst="rect">
             <a:avLst/>
@@ -6898,30 +6755,6 @@
           </a:bodyPr>
           <a:p>
             <a:pPr marL="179280" indent="-178560">
-              <a:lnSpc>
-                <a:spcPct val="125000"/>
-              </a:lnSpc>
-              <a:buClr>
-                <a:srgbClr val="0065bd"/>
-              </a:buClr>
-              <a:buFont typeface="Wingdings" charset="2"/>
-              <a:buChar char=""/>
-            </a:pPr>
-            <a:r>
-              <a:rPr b="0" lang="en-US" sz="2000" spc="-1" strike="noStrike">
-                <a:solidFill>
-                  <a:srgbClr val="000000"/>
-                </a:solidFill>
-                <a:latin typeface="Arial"/>
-              </a:rPr>
-              <a:t>Approach</a:t>
-            </a:r>
-            <a:endParaRPr b="0" lang="en-US" sz="2000" spc="-1" strike="noStrike">
-              <a:latin typeface="Nimbus Sans"/>
-            </a:endParaRPr>
-          </a:p>
-          <a:p>
-            <a:pPr lvl="1" marL="360360" indent="-180360">
               <a:lnSpc>
                 <a:spcPct val="125000"/>
               </a:lnSpc>
@@ -6938,14 +6771,14 @@
                 </a:solidFill>
                 <a:latin typeface="Arial"/>
               </a:rPr>
-              <a:t>Main steps/tasks to achieve the goal:</a:t>
+              <a:t>Currently commercial solutions exist for tracking but are expensive and bulky</a:t>
             </a:r>
             <a:endParaRPr b="0" lang="en-US" sz="1800" spc="-1" strike="noStrike">
               <a:latin typeface="Nimbus Sans"/>
             </a:endParaRPr>
           </a:p>
           <a:p>
-            <a:pPr lvl="1" marL="360360" indent="-180360">
+            <a:pPr marL="179280" indent="-178560">
               <a:lnSpc>
                 <a:spcPct val="125000"/>
               </a:lnSpc>
@@ -6962,14 +6795,23 @@
                 </a:solidFill>
                 <a:latin typeface="Arial"/>
               </a:rPr>
-              <a:t>Modeling of ...</a:t>
+              <a:t>They use the MPPT (mean peak power tracking) algorithms which are complex </a:t>
+            </a:r>
+            <a:r>
+              <a:rPr b="0" lang="en-US" sz="1800" spc="-1" strike="noStrike">
+                <a:solidFill>
+                  <a:srgbClr val="000000"/>
+                </a:solidFill>
+                <a:latin typeface="Arial"/>
+              </a:rPr>
+              <a:t>and take time consuming to develop.</a:t>
             </a:r>
             <a:endParaRPr b="0" lang="en-US" sz="1800" spc="-1" strike="noStrike">
               <a:latin typeface="Nimbus Sans"/>
             </a:endParaRPr>
           </a:p>
           <a:p>
-            <a:pPr lvl="1" marL="360360" indent="-180360">
+            <a:pPr marL="179280" indent="-178560">
               <a:lnSpc>
                 <a:spcPct val="125000"/>
               </a:lnSpc>
@@ -6986,14 +6828,164 @@
                 </a:solidFill>
                 <a:latin typeface="Arial"/>
               </a:rPr>
-              <a:t>Implementation of ... Into ... Using ...</a:t>
+              <a:t>These include single-axis and dual-axis tracking systems</a:t>
             </a:r>
             <a:endParaRPr b="0" lang="en-US" sz="1800" spc="-1" strike="noStrike">
               <a:latin typeface="Nimbus Sans"/>
             </a:endParaRPr>
           </a:p>
           <a:p>
-            <a:pPr lvl="1" marL="360360" indent="-180360">
+            <a:pPr>
+              <a:lnSpc>
+                <a:spcPct val="125000"/>
+              </a:lnSpc>
+            </a:pPr>
+            <a:endParaRPr b="0" lang="en-US" sz="1800" spc="-1" strike="noStrike">
+              <a:latin typeface="Nimbus Sans"/>
+            </a:endParaRPr>
+          </a:p>
+          <a:p>
+            <a:pPr>
+              <a:lnSpc>
+                <a:spcPct val="125000"/>
+              </a:lnSpc>
+            </a:pPr>
+            <a:endParaRPr b="0" lang="en-US" sz="1800" spc="-1" strike="noStrike">
+              <a:latin typeface="Nimbus Sans"/>
+            </a:endParaRPr>
+          </a:p>
+          <a:p>
+            <a:pPr>
+              <a:lnSpc>
+                <a:spcPct val="125000"/>
+              </a:lnSpc>
+            </a:pPr>
+            <a:endParaRPr b="0" lang="en-US" sz="1800" spc="-1" strike="noStrike">
+              <a:latin typeface="Nimbus Sans"/>
+            </a:endParaRPr>
+          </a:p>
+        </p:txBody>
+      </p:sp>
+      <p:sp>
+        <p:nvSpPr>
+          <p:cNvPr id="141" name="CustomShape 2"/>
+          <p:cNvSpPr/>
+          <p:nvPr/>
+        </p:nvSpPr>
+        <p:spPr>
+          <a:xfrm>
+            <a:off x="358920" y="366480"/>
+            <a:ext cx="7166880" cy="359280"/>
+          </a:xfrm>
+          <a:prstGeom prst="rect">
+            <a:avLst/>
+          </a:prstGeom>
+          <a:noFill/>
+          <a:ln>
+            <a:noFill/>
+          </a:ln>
+        </p:spPr>
+        <p:style>
+          <a:lnRef idx="0"/>
+          <a:fillRef idx="0"/>
+          <a:effectRef idx="0"/>
+          <a:fontRef idx="minor"/>
+        </p:style>
+        <p:txBody>
+          <a:bodyPr lIns="90000" rIns="90000" tIns="45000" bIns="45000" anchor="ctr">
+            <a:noAutofit/>
+          </a:bodyPr>
+          <a:p>
+            <a:pPr>
+              <a:lnSpc>
+                <a:spcPct val="125000"/>
+              </a:lnSpc>
+            </a:pPr>
+            <a:r>
+              <a:rPr b="0" lang="en-US" sz="2400" spc="-1" strike="noStrike">
+                <a:solidFill>
+                  <a:srgbClr val="000000"/>
+                </a:solidFill>
+                <a:latin typeface="Arial"/>
+              </a:rPr>
+              <a:t>Currently Available Solutions</a:t>
+            </a:r>
+            <a:endParaRPr b="0" lang="en-US" sz="2400" spc="-1" strike="noStrike">
+              <a:latin typeface="Nimbus Sans"/>
+            </a:endParaRPr>
+          </a:p>
+        </p:txBody>
+      </p:sp>
+      <p:sp>
+        <p:nvSpPr>
+          <p:cNvPr id="142" name="TextShape 3"/>
+          <p:cNvSpPr txBox="1"/>
+          <p:nvPr/>
+        </p:nvSpPr>
+        <p:spPr>
+          <a:xfrm>
+            <a:off x="358920" y="2926080"/>
+            <a:ext cx="4051800" cy="395640"/>
+          </a:xfrm>
+          <a:prstGeom prst="rect">
+            <a:avLst/>
+          </a:prstGeom>
+          <a:noFill/>
+          <a:ln>
+            <a:noFill/>
+          </a:ln>
+        </p:spPr>
+        <p:txBody>
+          <a:bodyPr lIns="90000" rIns="90000" tIns="45000" bIns="45000">
+            <a:spAutoFit/>
+          </a:bodyPr>
+          <a:p>
+            <a:r>
+              <a:rPr b="0" lang="en-US" sz="2200" spc="-1" strike="noStrike">
+                <a:solidFill>
+                  <a:srgbClr val="000000"/>
+                </a:solidFill>
+                <a:latin typeface="Arial"/>
+              </a:rPr>
+              <a:t>Our Solution</a:t>
+            </a:r>
+            <a:endParaRPr b="0" lang="en-US" sz="2200" spc="-1" strike="noStrike">
+              <a:latin typeface="Nimbus Sans"/>
+            </a:endParaRPr>
+          </a:p>
+        </p:txBody>
+      </p:sp>
+      <p:sp>
+        <p:nvSpPr>
+          <p:cNvPr id="143" name="CustomShape 4"/>
+          <p:cNvSpPr/>
+          <p:nvPr/>
+        </p:nvSpPr>
+        <p:spPr>
+          <a:xfrm>
+            <a:off x="358920" y="3318120"/>
+            <a:ext cx="8421120" cy="1659960"/>
+          </a:xfrm>
+          <a:prstGeom prst="rect">
+            <a:avLst/>
+          </a:prstGeom>
+          <a:noFill/>
+          <a:ln>
+            <a:noFill/>
+          </a:ln>
+        </p:spPr>
+        <p:style>
+          <a:lnRef idx="0"/>
+          <a:fillRef idx="0"/>
+          <a:effectRef idx="0"/>
+          <a:fontRef idx="minor"/>
+        </p:style>
+        <p:txBody>
+          <a:bodyPr lIns="90000" rIns="90000" tIns="45000" bIns="45000">
+            <a:noAutofit/>
+          </a:bodyPr>
+          <a:p>
+            <a:pPr marL="179280" indent="-178560">
               <a:lnSpc>
                 <a:spcPct val="125000"/>
               </a:lnSpc>
@@ -7010,22 +7002,23 @@
                 </a:solidFill>
                 <a:latin typeface="Arial"/>
               </a:rPr>
-              <a:t>Simulation ... Of ... Using ...</a:t>
+              <a:t>In our proof of concept we are going to explore using the following</a:t>
             </a:r>
             <a:endParaRPr b="0" lang="en-US" sz="1800" spc="-1" strike="noStrike">
               <a:latin typeface="Nimbus Sans"/>
             </a:endParaRPr>
           </a:p>
           <a:p>
-            <a:pPr lvl="1" marL="360360" indent="-180360">
+            <a:pPr lvl="1" marL="432000" indent="-216000">
               <a:lnSpc>
                 <a:spcPct val="125000"/>
               </a:lnSpc>
               <a:buClr>
-                <a:srgbClr val="0065bd"/>
+                <a:srgbClr val="000000"/>
               </a:buClr>
+              <a:buSzPct val="45000"/>
               <a:buFont typeface="Wingdings" charset="2"/>
-              <a:buChar char=""/>
+              <a:buChar char=""/>
             </a:pPr>
             <a:r>
               <a:rPr b="0" lang="en-US" sz="1800" spc="-1" strike="noStrike">
@@ -7034,22 +7027,23 @@
                 </a:solidFill>
                 <a:latin typeface="Arial"/>
               </a:rPr>
-              <a:t>Comparison of ...</a:t>
+              <a:t>Control the panels rotation using a servo driven by a mote </a:t>
             </a:r>
             <a:endParaRPr b="0" lang="en-US" sz="1800" spc="-1" strike="noStrike">
               <a:latin typeface="Nimbus Sans"/>
             </a:endParaRPr>
           </a:p>
           <a:p>
-            <a:pPr lvl="1" marL="360360" indent="-180360">
+            <a:pPr lvl="1" marL="432000" indent="-216000">
               <a:lnSpc>
                 <a:spcPct val="125000"/>
               </a:lnSpc>
               <a:buClr>
-                <a:srgbClr val="0065bd"/>
+                <a:srgbClr val="000000"/>
               </a:buClr>
+              <a:buSzPct val="45000"/>
               <a:buFont typeface="Wingdings" charset="2"/>
-              <a:buChar char=""/>
+              <a:buChar char=""/>
             </a:pPr>
             <a:r>
               <a:rPr b="0" lang="en-US" sz="1800" spc="-1" strike="noStrike">
@@ -7058,56 +7052,23 @@
                 </a:solidFill>
                 <a:latin typeface="Arial"/>
               </a:rPr>
-              <a:t>...</a:t>
+              <a:t>Single axis East to West daily sun tracking</a:t>
             </a:r>
             <a:endParaRPr b="0" lang="en-US" sz="1800" spc="-1" strike="noStrike">
               <a:latin typeface="Nimbus Sans"/>
             </a:endParaRPr>
           </a:p>
           <a:p>
-            <a:pPr>
-              <a:lnSpc>
-                <a:spcPct val="100000"/>
-              </a:lnSpc>
-            </a:pPr>
-            <a:endParaRPr b="0" lang="en-US" sz="1800" spc="-1" strike="noStrike">
-              <a:latin typeface="Nimbus Sans"/>
-            </a:endParaRPr>
-          </a:p>
-          <a:p>
-            <a:pPr marL="179280" indent="-178560">
+            <a:pPr lvl="1" marL="432000" indent="-216000">
               <a:lnSpc>
                 <a:spcPct val="125000"/>
               </a:lnSpc>
               <a:buClr>
-                <a:srgbClr val="0065bd"/>
+                <a:srgbClr val="000000"/>
               </a:buClr>
+              <a:buSzPct val="45000"/>
               <a:buFont typeface="Wingdings" charset="2"/>
-              <a:buChar char=""/>
-            </a:pPr>
-            <a:r>
-              <a:rPr b="0" lang="en-US" sz="2000" spc="-1" strike="noStrike">
-                <a:solidFill>
-                  <a:srgbClr val="000000"/>
-                </a:solidFill>
-                <a:latin typeface="Arial"/>
-              </a:rPr>
-              <a:t>Expected result(s)</a:t>
-            </a:r>
-            <a:endParaRPr b="0" lang="en-US" sz="2000" spc="-1" strike="noStrike">
-              <a:latin typeface="Nimbus Sans"/>
-            </a:endParaRPr>
-          </a:p>
-          <a:p>
-            <a:pPr lvl="1" marL="360360" indent="-180360">
-              <a:lnSpc>
-                <a:spcPct val="125000"/>
-              </a:lnSpc>
-              <a:buClr>
-                <a:srgbClr val="0065bd"/>
-              </a:buClr>
-              <a:buFont typeface="Wingdings" charset="2"/>
-              <a:buChar char=""/>
+              <a:buChar char=""/>
             </a:pPr>
             <a:r>
               <a:rPr b="0" lang="en-US" sz="1800" spc="-1" strike="noStrike">
@@ -7116,109 +7077,64 @@
                 </a:solidFill>
                 <a:latin typeface="Arial"/>
               </a:rPr>
-              <a:t>What should be the outcome and why this is important</a:t>
+              <a:t>Individual Panel Power tracking</a:t>
             </a:r>
             <a:endParaRPr b="0" lang="en-US" sz="1800" spc="-1" strike="noStrike">
               <a:latin typeface="Nimbus Sans"/>
             </a:endParaRPr>
           </a:p>
-        </p:txBody>
-      </p:sp>
-      <p:sp>
-        <p:nvSpPr>
-          <p:cNvPr id="141" name="CustomShape 2"/>
-          <p:cNvSpPr/>
-          <p:nvPr/>
-        </p:nvSpPr>
-        <p:spPr>
-          <a:xfrm>
-            <a:off x="358920" y="366480"/>
-            <a:ext cx="7166880" cy="359280"/>
-          </a:xfrm>
-          <a:prstGeom prst="rect">
-            <a:avLst/>
-          </a:prstGeom>
-          <a:noFill/>
-          <a:ln>
-            <a:noFill/>
-          </a:ln>
-        </p:spPr>
-        <p:style>
-          <a:lnRef idx="0"/>
-          <a:fillRef idx="0"/>
-          <a:effectRef idx="0"/>
-          <a:fontRef idx="minor"/>
-        </p:style>
-        <p:txBody>
-          <a:bodyPr lIns="90000" rIns="90000" tIns="45000" bIns="45000" anchor="ctr">
-            <a:noAutofit/>
-          </a:bodyPr>
+          <a:p>
+            <a:pPr lvl="1" marL="432000" indent="-216000">
+              <a:lnSpc>
+                <a:spcPct val="125000"/>
+              </a:lnSpc>
+              <a:buClr>
+                <a:srgbClr val="000000"/>
+              </a:buClr>
+              <a:buSzPct val="45000"/>
+              <a:buFont typeface="Wingdings" charset="2"/>
+              <a:buChar char=""/>
+            </a:pPr>
+            <a:r>
+              <a:rPr b="0" lang="en-US" sz="1800" spc="-1" strike="noStrike">
+                <a:solidFill>
+                  <a:srgbClr val="000000"/>
+                </a:solidFill>
+                <a:latin typeface="Arial"/>
+              </a:rPr>
+              <a:t>Base station monitoring the status of the panels</a:t>
+            </a:r>
+            <a:endParaRPr b="0" lang="en-US" sz="1800" spc="-1" strike="noStrike">
+              <a:latin typeface="Nimbus Sans"/>
+            </a:endParaRPr>
+          </a:p>
           <a:p>
             <a:pPr>
               <a:lnSpc>
                 <a:spcPct val="125000"/>
               </a:lnSpc>
             </a:pPr>
-            <a:r>
-              <a:rPr b="0" lang="en-US" sz="2400" spc="-1" strike="noStrike">
-                <a:solidFill>
-                  <a:srgbClr val="000000"/>
-                </a:solidFill>
-                <a:latin typeface="Arial"/>
-              </a:rPr>
-              <a:t>Approach and expected results</a:t>
-            </a:r>
-            <a:endParaRPr b="0" lang="en-US" sz="2400" spc="-1" strike="noStrike">
-              <a:latin typeface="Nimbus Sans"/>
-            </a:endParaRPr>
-          </a:p>
-        </p:txBody>
-      </p:sp>
-      <p:sp>
-        <p:nvSpPr>
-          <p:cNvPr id="142" name="CustomShape 3"/>
-          <p:cNvSpPr/>
-          <p:nvPr/>
-        </p:nvSpPr>
-        <p:spPr>
-          <a:xfrm>
-            <a:off x="8238960" y="6441840"/>
-            <a:ext cx="563040" cy="358200"/>
-          </a:xfrm>
-          <a:prstGeom prst="rect">
-            <a:avLst/>
-          </a:prstGeom>
-          <a:noFill/>
-          <a:ln>
-            <a:noFill/>
-          </a:ln>
-        </p:spPr>
-        <p:style>
-          <a:lnRef idx="0"/>
-          <a:fillRef idx="0"/>
-          <a:effectRef idx="0"/>
-          <a:fontRef idx="minor"/>
-        </p:style>
-        <p:txBody>
-          <a:bodyPr lIns="90000" rIns="90000" tIns="45000" bIns="45000">
-            <a:noAutofit/>
-          </a:bodyPr>
-          <a:p>
-            <a:pPr algn="r">
+            <a:endParaRPr b="0" lang="en-US" sz="1800" spc="-1" strike="noStrike">
+              <a:latin typeface="Nimbus Sans"/>
+            </a:endParaRPr>
+          </a:p>
+          <a:p>
+            <a:pPr>
               <a:lnSpc>
-                <a:spcPct val="100000"/>
+                <a:spcPct val="125000"/>
               </a:lnSpc>
             </a:pPr>
-            <a:fld id="{FC30C53A-922C-4249-8A1F-AF7E17A2EF2B}" type="slidenum">
-              <a:rPr b="0" lang="en-US" sz="1200" spc="-1" strike="noStrike">
-                <a:solidFill>
-                  <a:srgbClr val="000000"/>
-                </a:solidFill>
-                <a:latin typeface="Arial"/>
-              </a:rPr>
-              <a:t>1</a:t>
-            </a:fld>
-            <a:endParaRPr b="0" lang="en-US" sz="1200" spc="-1" strike="noStrike">
+            <a:endParaRPr b="0" lang="en-US" sz="1800" spc="-1" strike="noStrike">
+              <a:latin typeface="Nimbus Sans"/>
+            </a:endParaRPr>
+          </a:p>
+          <a:p>
+            <a:pPr>
+              <a:lnSpc>
+                <a:spcPct val="125000"/>
+              </a:lnSpc>
+            </a:pPr>
+            <a:endParaRPr b="0" lang="en-US" sz="1800" spc="-1" strike="noStrike">
               <a:latin typeface="Nimbus Sans"/>
             </a:endParaRPr>
           </a:p>
@@ -7254,29 +7170,6 @@
           <a:chExt cx="0" cy="0"/>
         </a:xfrm>
       </p:grpSpPr>
-      <p:pic>
-        <p:nvPicPr>
-          <p:cNvPr id="143" name="Grafik 3" descr=""/>
-          <p:cNvPicPr/>
-          <p:nvPr/>
-        </p:nvPicPr>
-        <p:blipFill>
-          <a:blip r:embed="rId1"/>
-          <a:stretch/>
-        </p:blipFill>
-        <p:spPr>
-          <a:xfrm>
-            <a:off x="971640" y="1880280"/>
-            <a:ext cx="3788640" cy="3788640"/>
-          </a:xfrm>
-          <a:prstGeom prst="rect">
-            <a:avLst/>
-          </a:prstGeom>
-          <a:ln>
-            <a:noFill/>
-          </a:ln>
-        </p:spPr>
-      </p:pic>
       <p:sp>
         <p:nvSpPr>
           <p:cNvPr id="144" name="CustomShape 1"/>
@@ -7285,8 +7178,8 @@
         </p:nvSpPr>
         <p:spPr>
           <a:xfrm>
-            <a:off x="358920" y="367200"/>
-            <a:ext cx="7162560" cy="359280"/>
+            <a:off x="358920" y="1266120"/>
+            <a:ext cx="8421120" cy="5000760"/>
           </a:xfrm>
           <a:prstGeom prst="rect">
             <a:avLst/>
@@ -7302,6 +7195,237 @@
           <a:effectRef idx="0"/>
           <a:fontRef idx="minor"/>
         </p:style>
+        <p:txBody>
+          <a:bodyPr lIns="90000" rIns="90000" tIns="45000" bIns="45000">
+            <a:noAutofit/>
+          </a:bodyPr>
+          <a:p>
+            <a:pPr marL="179280" indent="-178560">
+              <a:lnSpc>
+                <a:spcPct val="125000"/>
+              </a:lnSpc>
+              <a:buClr>
+                <a:srgbClr val="0065bd"/>
+              </a:buClr>
+              <a:buFont typeface="Wingdings" charset="2"/>
+              <a:buChar char=""/>
+            </a:pPr>
+            <a:r>
+              <a:rPr b="0" lang="en-US" sz="2000" spc="-1" strike="noStrike">
+                <a:solidFill>
+                  <a:srgbClr val="000000"/>
+                </a:solidFill>
+                <a:latin typeface="Arial"/>
+              </a:rPr>
+              <a:t>Our Approach</a:t>
+            </a:r>
+            <a:endParaRPr b="0" lang="en-US" sz="2000" spc="-1" strike="noStrike">
+              <a:latin typeface="Nimbus Sans"/>
+            </a:endParaRPr>
+          </a:p>
+          <a:p>
+            <a:pPr lvl="1" marL="360360" indent="-180360">
+              <a:lnSpc>
+                <a:spcPct val="125000"/>
+              </a:lnSpc>
+              <a:buClr>
+                <a:srgbClr val="0065bd"/>
+              </a:buClr>
+              <a:buFont typeface="Wingdings" charset="2"/>
+              <a:buChar char=""/>
+            </a:pPr>
+            <a:r>
+              <a:rPr b="0" lang="en-US" sz="1800" spc="-1" strike="noStrike">
+                <a:solidFill>
+                  <a:srgbClr val="000000"/>
+                </a:solidFill>
+                <a:latin typeface="Arial"/>
+              </a:rPr>
+              <a:t>Main steps/tasks to achieve the goal:</a:t>
+            </a:r>
+            <a:endParaRPr b="0" lang="en-US" sz="1800" spc="-1" strike="noStrike">
+              <a:latin typeface="Nimbus Sans"/>
+            </a:endParaRPr>
+          </a:p>
+          <a:p>
+            <a:pPr lvl="1" marL="360360" indent="-180360">
+              <a:lnSpc>
+                <a:spcPct val="125000"/>
+              </a:lnSpc>
+              <a:buClr>
+                <a:srgbClr val="0065bd"/>
+              </a:buClr>
+              <a:buFont typeface="Wingdings" charset="2"/>
+              <a:buChar char=""/>
+            </a:pPr>
+            <a:r>
+              <a:rPr b="0" lang="en-US" sz="1800" spc="-1" strike="noStrike">
+                <a:solidFill>
+                  <a:srgbClr val="000000"/>
+                </a:solidFill>
+                <a:latin typeface="Arial"/>
+              </a:rPr>
+              <a:t>Modeling of ...</a:t>
+            </a:r>
+            <a:endParaRPr b="0" lang="en-US" sz="1800" spc="-1" strike="noStrike">
+              <a:latin typeface="Nimbus Sans"/>
+            </a:endParaRPr>
+          </a:p>
+          <a:p>
+            <a:pPr lvl="1" marL="360360" indent="-180360">
+              <a:lnSpc>
+                <a:spcPct val="125000"/>
+              </a:lnSpc>
+              <a:buClr>
+                <a:srgbClr val="0065bd"/>
+              </a:buClr>
+              <a:buFont typeface="Wingdings" charset="2"/>
+              <a:buChar char=""/>
+            </a:pPr>
+            <a:r>
+              <a:rPr b="0" lang="en-US" sz="1800" spc="-1" strike="noStrike">
+                <a:solidFill>
+                  <a:srgbClr val="000000"/>
+                </a:solidFill>
+                <a:latin typeface="Arial"/>
+              </a:rPr>
+              <a:t>Implementation of ... Into ... Using ...</a:t>
+            </a:r>
+            <a:endParaRPr b="0" lang="en-US" sz="1800" spc="-1" strike="noStrike">
+              <a:latin typeface="Nimbus Sans"/>
+            </a:endParaRPr>
+          </a:p>
+          <a:p>
+            <a:pPr lvl="1" marL="360360" indent="-180360">
+              <a:lnSpc>
+                <a:spcPct val="125000"/>
+              </a:lnSpc>
+              <a:buClr>
+                <a:srgbClr val="0065bd"/>
+              </a:buClr>
+              <a:buFont typeface="Wingdings" charset="2"/>
+              <a:buChar char=""/>
+            </a:pPr>
+            <a:r>
+              <a:rPr b="0" lang="en-US" sz="1800" spc="-1" strike="noStrike">
+                <a:solidFill>
+                  <a:srgbClr val="000000"/>
+                </a:solidFill>
+                <a:latin typeface="Arial"/>
+              </a:rPr>
+              <a:t>Simulation ... Of ... Using ...</a:t>
+            </a:r>
+            <a:endParaRPr b="0" lang="en-US" sz="1800" spc="-1" strike="noStrike">
+              <a:latin typeface="Nimbus Sans"/>
+            </a:endParaRPr>
+          </a:p>
+          <a:p>
+            <a:pPr lvl="1" marL="360360" indent="-180360">
+              <a:lnSpc>
+                <a:spcPct val="125000"/>
+              </a:lnSpc>
+              <a:buClr>
+                <a:srgbClr val="0065bd"/>
+              </a:buClr>
+              <a:buFont typeface="Wingdings" charset="2"/>
+              <a:buChar char=""/>
+            </a:pPr>
+            <a:r>
+              <a:rPr b="0" lang="en-US" sz="1800" spc="-1" strike="noStrike">
+                <a:solidFill>
+                  <a:srgbClr val="000000"/>
+                </a:solidFill>
+                <a:latin typeface="Arial"/>
+              </a:rPr>
+              <a:t>Comparison of ...</a:t>
+            </a:r>
+            <a:endParaRPr b="0" lang="en-US" sz="1800" spc="-1" strike="noStrike">
+              <a:latin typeface="Nimbus Sans"/>
+            </a:endParaRPr>
+          </a:p>
+          <a:p>
+            <a:pPr lvl="1" marL="360360" indent="-180360">
+              <a:lnSpc>
+                <a:spcPct val="125000"/>
+              </a:lnSpc>
+              <a:buClr>
+                <a:srgbClr val="0065bd"/>
+              </a:buClr>
+              <a:buFont typeface="Wingdings" charset="2"/>
+              <a:buChar char=""/>
+            </a:pPr>
+            <a:r>
+              <a:rPr b="0" lang="en-US" sz="1800" spc="-1" strike="noStrike">
+                <a:solidFill>
+                  <a:srgbClr val="000000"/>
+                </a:solidFill>
+                <a:latin typeface="Arial"/>
+              </a:rPr>
+              <a:t>...</a:t>
+            </a:r>
+            <a:endParaRPr b="0" lang="en-US" sz="1800" spc="-1" strike="noStrike">
+              <a:latin typeface="Nimbus Sans"/>
+            </a:endParaRPr>
+          </a:p>
+          <a:p>
+            <a:pPr>
+              <a:lnSpc>
+                <a:spcPct val="100000"/>
+              </a:lnSpc>
+            </a:pPr>
+            <a:endParaRPr b="0" lang="en-US" sz="1800" spc="-1" strike="noStrike">
+              <a:latin typeface="Nimbus Sans"/>
+            </a:endParaRPr>
+          </a:p>
+          <a:p>
+            <a:pPr marL="179280" indent="-178560">
+              <a:lnSpc>
+                <a:spcPct val="125000"/>
+              </a:lnSpc>
+              <a:buClr>
+                <a:srgbClr val="0065bd"/>
+              </a:buClr>
+              <a:buFont typeface="Wingdings" charset="2"/>
+              <a:buChar char=""/>
+            </a:pPr>
+            <a:r>
+              <a:rPr b="0" lang="en-US" sz="2000" spc="-1" strike="noStrike">
+                <a:solidFill>
+                  <a:srgbClr val="000000"/>
+                </a:solidFill>
+                <a:latin typeface="Arial"/>
+              </a:rPr>
+              <a:t>Expected result(s)</a:t>
+            </a:r>
+            <a:endParaRPr b="0" lang="en-US" sz="2000" spc="-1" strike="noStrike">
+              <a:latin typeface="Nimbus Sans"/>
+            </a:endParaRPr>
+          </a:p>
+          <a:p>
+            <a:pPr lvl="1" marL="360360" indent="-180360">
+              <a:lnSpc>
+                <a:spcPct val="125000"/>
+              </a:lnSpc>
+              <a:buClr>
+                <a:srgbClr val="0065bd"/>
+              </a:buClr>
+              <a:buFont typeface="Wingdings" charset="2"/>
+              <a:buChar char=""/>
+            </a:pPr>
+            <a:r>
+              <a:rPr b="0" lang="en-US" sz="1800" spc="-1" strike="noStrike">
+                <a:solidFill>
+                  <a:srgbClr val="000000"/>
+                </a:solidFill>
+                <a:latin typeface="Arial"/>
+              </a:rPr>
+              <a:t>What should be the outcome and why this is important</a:t>
+            </a:r>
+            <a:endParaRPr b="0" lang="en-US" sz="1800" spc="-1" strike="noStrike">
+              <a:latin typeface="Nimbus Sans"/>
+            </a:endParaRPr>
+          </a:p>
+        </p:txBody>
       </p:sp>
       <p:sp>
         <p:nvSpPr>
@@ -7311,8 +7435,8 @@
         </p:nvSpPr>
         <p:spPr>
           <a:xfrm>
-            <a:off x="358920" y="1276200"/>
-            <a:ext cx="8421120" cy="4990680"/>
+            <a:off x="358920" y="366480"/>
+            <a:ext cx="7166880" cy="359280"/>
           </a:xfrm>
           <a:prstGeom prst="rect">
             <a:avLst/>
@@ -7329,84 +7453,25 @@
           <a:fontRef idx="minor"/>
         </p:style>
         <p:txBody>
-          <a:bodyPr lIns="90000" rIns="90000" tIns="45000" bIns="45000">
+          <a:bodyPr lIns="90000" rIns="90000" tIns="45000" bIns="45000" anchor="ctr">
             <a:noAutofit/>
           </a:bodyPr>
           <a:p>
-            <a:pPr algn="ctr">
-              <a:lnSpc>
-                <a:spcPct val="125000"/>
-              </a:lnSpc>
-            </a:pPr>
-            <a:endParaRPr b="0" lang="en-US" sz="1800" spc="-1" strike="noStrike">
-              <a:latin typeface="Nimbus Sans"/>
-            </a:endParaRPr>
-          </a:p>
-          <a:p>
-            <a:pPr algn="ctr">
-              <a:lnSpc>
-                <a:spcPct val="125000"/>
-              </a:lnSpc>
-            </a:pPr>
-            <a:endParaRPr b="0" lang="en-US" sz="1800" spc="-1" strike="noStrike">
-              <a:latin typeface="Nimbus Sans"/>
-            </a:endParaRPr>
-          </a:p>
-          <a:p>
-            <a:pPr algn="ctr">
-              <a:lnSpc>
-                <a:spcPct val="125000"/>
-              </a:lnSpc>
-            </a:pPr>
-            <a:endParaRPr b="0" lang="en-US" sz="1800" spc="-1" strike="noStrike">
-              <a:latin typeface="Nimbus Sans"/>
-            </a:endParaRPr>
-          </a:p>
-          <a:p>
-            <a:pPr algn="ctr">
+            <a:pPr>
               <a:lnSpc>
                 <a:spcPct val="125000"/>
               </a:lnSpc>
             </a:pPr>
             <a:r>
-              <a:rPr b="0" lang="en-US" sz="4000" spc="-1" strike="noStrike">
+              <a:rPr b="0" lang="en-US" sz="2400" spc="-1" strike="noStrike">
                 <a:solidFill>
                   <a:srgbClr val="000000"/>
                 </a:solidFill>
                 <a:latin typeface="Arial"/>
               </a:rPr>
-              <a:t>	</a:t>
+              <a:t>Approach and expected results</a:t>
             </a:r>
-            <a:r>
-              <a:rPr b="0" lang="en-US" sz="4000" spc="-1" strike="noStrike">
-                <a:solidFill>
-                  <a:srgbClr val="000000"/>
-                </a:solidFill>
-                <a:latin typeface="Arial"/>
-              </a:rPr>
-              <a:t>Questions?</a:t>
-            </a:r>
-            <a:endParaRPr b="0" lang="en-US" sz="4000" spc="-1" strike="noStrike">
-              <a:latin typeface="Nimbus Sans"/>
-            </a:endParaRPr>
-          </a:p>
-          <a:p>
-            <a:pPr algn="ctr">
-              <a:lnSpc>
-                <a:spcPct val="125000"/>
-              </a:lnSpc>
-            </a:pPr>
-            <a:endParaRPr b="0" lang="en-US" sz="4000" spc="-1" strike="noStrike">
-              <a:latin typeface="Nimbus Sans"/>
-            </a:endParaRPr>
-          </a:p>
-          <a:p>
-            <a:pPr algn="ctr">
-              <a:lnSpc>
-                <a:spcPct val="125000"/>
-              </a:lnSpc>
-            </a:pPr>
-            <a:endParaRPr b="0" lang="en-US" sz="4000" spc="-1" strike="noStrike">
+            <a:endParaRPr b="0" lang="en-US" sz="2400" spc="-1" strike="noStrike">
               <a:latin typeface="Nimbus Sans"/>
             </a:endParaRPr>
           </a:p>
@@ -7447,14 +7512,14 @@
                 <a:spcPct val="100000"/>
               </a:lnSpc>
             </a:pPr>
-            <a:fld id="{EEB2F43A-BD0B-4436-86AA-E722D69183C7}" type="slidenum">
+            <a:fld id="{0B7C1DF0-0E79-4369-A685-2212F7C7BB4C}" type="slidenum">
               <a:rPr b="0" lang="en-US" sz="1200" spc="-1" strike="noStrike">
                 <a:solidFill>
                   <a:srgbClr val="000000"/>
                 </a:solidFill>
                 <a:latin typeface="Arial"/>
               </a:rPr>
-              <a:t>&lt;number&gt;</a:t>
+              <a:t>1</a:t>
             </a:fld>
             <a:endParaRPr b="0" lang="en-US" sz="1200" spc="-1" strike="noStrike">
               <a:latin typeface="Nimbus Sans"/>
@@ -7492,16 +7557,39 @@
           <a:chExt cx="0" cy="0"/>
         </a:xfrm>
       </p:grpSpPr>
-      <p:sp>
-        <p:nvSpPr>
-          <p:cNvPr id="147" name="CustomShape 1"/>
+      <p:pic>
+        <p:nvPicPr>
+          <p:cNvPr id="147" name="Grafik 3" descr=""/>
+          <p:cNvPicPr/>
+          <p:nvPr/>
+        </p:nvPicPr>
+        <p:blipFill>
+          <a:blip r:embed="rId1"/>
+          <a:stretch/>
+        </p:blipFill>
+        <p:spPr>
+          <a:xfrm>
+            <a:off x="971640" y="1880280"/>
+            <a:ext cx="3788640" cy="3788640"/>
+          </a:xfrm>
+          <a:prstGeom prst="rect">
+            <a:avLst/>
+          </a:prstGeom>
+          <a:ln>
+            <a:noFill/>
+          </a:ln>
+        </p:spPr>
+      </p:pic>
+      <p:sp>
+        <p:nvSpPr>
+          <p:cNvPr id="148" name="CustomShape 1"/>
           <p:cNvSpPr/>
           <p:nvPr/>
         </p:nvSpPr>
         <p:spPr>
           <a:xfrm>
-            <a:off x="7763040" y="6428880"/>
-            <a:ext cx="1017000" cy="364320"/>
+            <a:off x="358920" y="367200"/>
+            <a:ext cx="7162560" cy="359280"/>
           </a:xfrm>
           <a:prstGeom prst="rect">
             <a:avLst/>
@@ -7517,6 +7605,141 @@
           <a:effectRef idx="0"/>
           <a:fontRef idx="minor"/>
         </p:style>
+      </p:sp>
+      <p:sp>
+        <p:nvSpPr>
+          <p:cNvPr id="149" name="CustomShape 2"/>
+          <p:cNvSpPr/>
+          <p:nvPr/>
+        </p:nvSpPr>
+        <p:spPr>
+          <a:xfrm>
+            <a:off x="358920" y="1276200"/>
+            <a:ext cx="8421120" cy="4990680"/>
+          </a:xfrm>
+          <a:prstGeom prst="rect">
+            <a:avLst/>
+          </a:prstGeom>
+          <a:noFill/>
+          <a:ln>
+            <a:noFill/>
+          </a:ln>
+        </p:spPr>
+        <p:style>
+          <a:lnRef idx="0"/>
+          <a:fillRef idx="0"/>
+          <a:effectRef idx="0"/>
+          <a:fontRef idx="minor"/>
+        </p:style>
+        <p:txBody>
+          <a:bodyPr lIns="90000" rIns="90000" tIns="45000" bIns="45000">
+            <a:noAutofit/>
+          </a:bodyPr>
+          <a:p>
+            <a:pPr algn="ctr">
+              <a:lnSpc>
+                <a:spcPct val="125000"/>
+              </a:lnSpc>
+            </a:pPr>
+            <a:endParaRPr b="0" lang="en-US" sz="1800" spc="-1" strike="noStrike">
+              <a:latin typeface="Nimbus Sans"/>
+            </a:endParaRPr>
+          </a:p>
+          <a:p>
+            <a:pPr algn="ctr">
+              <a:lnSpc>
+                <a:spcPct val="125000"/>
+              </a:lnSpc>
+            </a:pPr>
+            <a:endParaRPr b="0" lang="en-US" sz="1800" spc="-1" strike="noStrike">
+              <a:latin typeface="Nimbus Sans"/>
+            </a:endParaRPr>
+          </a:p>
+          <a:p>
+            <a:pPr algn="ctr">
+              <a:lnSpc>
+                <a:spcPct val="125000"/>
+              </a:lnSpc>
+            </a:pPr>
+            <a:endParaRPr b="0" lang="en-US" sz="1800" spc="-1" strike="noStrike">
+              <a:latin typeface="Nimbus Sans"/>
+            </a:endParaRPr>
+          </a:p>
+          <a:p>
+            <a:pPr algn="ctr">
+              <a:lnSpc>
+                <a:spcPct val="125000"/>
+              </a:lnSpc>
+            </a:pPr>
+            <a:r>
+              <a:rPr b="0" lang="en-US" sz="4000" spc="-1" strike="noStrike">
+                <a:solidFill>
+                  <a:srgbClr val="000000"/>
+                </a:solidFill>
+                <a:latin typeface="Arial"/>
+              </a:rPr>
+              <a:t>	</a:t>
+            </a:r>
+            <a:r>
+              <a:rPr b="0" lang="en-US" sz="4000" spc="-1" strike="noStrike">
+                <a:solidFill>
+                  <a:srgbClr val="000000"/>
+                </a:solidFill>
+                <a:latin typeface="Arial"/>
+              </a:rPr>
+              <a:t>Questions?</a:t>
+            </a:r>
+            <a:endParaRPr b="0" lang="en-US" sz="4000" spc="-1" strike="noStrike">
+              <a:latin typeface="Nimbus Sans"/>
+            </a:endParaRPr>
+          </a:p>
+          <a:p>
+            <a:pPr algn="ctr">
+              <a:lnSpc>
+                <a:spcPct val="125000"/>
+              </a:lnSpc>
+            </a:pPr>
+            <a:endParaRPr b="0" lang="en-US" sz="4000" spc="-1" strike="noStrike">
+              <a:latin typeface="Nimbus Sans"/>
+            </a:endParaRPr>
+          </a:p>
+          <a:p>
+            <a:pPr algn="ctr">
+              <a:lnSpc>
+                <a:spcPct val="125000"/>
+              </a:lnSpc>
+            </a:pPr>
+            <a:endParaRPr b="0" lang="en-US" sz="4000" spc="-1" strike="noStrike">
+              <a:latin typeface="Nimbus Sans"/>
+            </a:endParaRPr>
+          </a:p>
+        </p:txBody>
+      </p:sp>
+      <p:sp>
+        <p:nvSpPr>
+          <p:cNvPr id="150" name="CustomShape 3"/>
+          <p:cNvSpPr/>
+          <p:nvPr/>
+        </p:nvSpPr>
+        <p:spPr>
+          <a:xfrm>
+            <a:off x="8238960" y="6441840"/>
+            <a:ext cx="563040" cy="358200"/>
+          </a:xfrm>
+          <a:prstGeom prst="rect">
+            <a:avLst/>
+          </a:prstGeom>
+          <a:noFill/>
+          <a:ln>
+            <a:noFill/>
+          </a:ln>
+        </p:spPr>
+        <p:style>
+          <a:lnRef idx="0"/>
+          <a:fillRef idx="0"/>
+          <a:effectRef idx="0"/>
+          <a:fontRef idx="minor"/>
+        </p:style>
         <p:txBody>
           <a:bodyPr lIns="90000" rIns="90000" tIns="45000" bIns="45000">
             <a:noAutofit/>
@@ -7527,7 +7750,7 @@
                 <a:spcPct val="100000"/>
               </a:lnSpc>
             </a:pPr>
-            <a:fld id="{377EAE02-5E51-4B06-83B7-C8CF03FC07FC}" type="slidenum">
+            <a:fld id="{1E4F8EB1-1C91-4FAA-9327-8C3D1832F79B}" type="slidenum">
               <a:rPr b="0" lang="en-US" sz="1200" spc="-1" strike="noStrike">
                 <a:solidFill>
                   <a:srgbClr val="000000"/>
@@ -7542,9 +7765,89 @@
           </a:p>
         </p:txBody>
       </p:sp>
-      <p:sp>
-        <p:nvSpPr>
-          <p:cNvPr id="148" name="CustomShape 2"/>
+    </p:spTree>
+  </p:cSld>
+  <mc:AlternateContent>
+    <mc:Choice Requires="p14">
+      <p:transition spd="slow" p14:dur="2000"/>
+    </mc:Choice>
+    <mc:Fallback>
+      <p:transition spd="slow"/>
+    </mc:Fallback>
+  </mc:AlternateContent>
+</p:sld>
+</file>
+
+<file path=ppt/slides/slide8.xml><?xml version="1.0" encoding="utf-8"?>
+<p:sld xmlns:a="http://schemas.openxmlformats.org/drawingml/2006/main" xmlns:p="http://schemas.openxmlformats.org/presentationml/2006/main" xmlns:r="http://schemas.openxmlformats.org/officeDocument/2006/relationships" xmlns:p14="http://schemas.microsoft.com/office/powerpoint/2010/main" xmlns:p15="http://schemas.microsoft.com/office/powerpoint/2012/main" xmlns:mc="http://schemas.openxmlformats.org/markup-compatibility/2006">
+  <p:cSld>
+    <p:spTree>
+      <p:nvGrpSpPr>
+        <p:cNvPr id="1" name=""/>
+        <p:cNvGrpSpPr/>
+        <p:nvPr/>
+      </p:nvGrpSpPr>
+      <p:grpSpPr>
+        <a:xfrm>
+          <a:off x="0" y="0"/>
+          <a:ext cx="0" cy="0"/>
+          <a:chOff x="0" y="0"/>
+          <a:chExt cx="0" cy="0"/>
+        </a:xfrm>
+      </p:grpSpPr>
+      <p:sp>
+        <p:nvSpPr>
+          <p:cNvPr id="151" name="CustomShape 1"/>
+          <p:cNvSpPr/>
+          <p:nvPr/>
+        </p:nvSpPr>
+        <p:spPr>
+          <a:xfrm>
+            <a:off x="7763040" y="6428880"/>
+            <a:ext cx="1017000" cy="364320"/>
+          </a:xfrm>
+          <a:prstGeom prst="rect">
+            <a:avLst/>
+          </a:prstGeom>
+          <a:noFill/>
+          <a:ln>
+            <a:noFill/>
+          </a:ln>
+        </p:spPr>
+        <p:style>
+          <a:lnRef idx="0"/>
+          <a:fillRef idx="0"/>
+          <a:effectRef idx="0"/>
+          <a:fontRef idx="minor"/>
+        </p:style>
+        <p:txBody>
+          <a:bodyPr lIns="90000" rIns="90000" tIns="45000" bIns="45000">
+            <a:noAutofit/>
+          </a:bodyPr>
+          <a:p>
+            <a:pPr algn="r">
+              <a:lnSpc>
+                <a:spcPct val="100000"/>
+              </a:lnSpc>
+            </a:pPr>
+            <a:fld id="{3D7E299F-1ED0-44FD-9E4C-1F99D61BC1D5}" type="slidenum">
+              <a:rPr b="0" lang="en-US" sz="1200" spc="-1" strike="noStrike">
+                <a:solidFill>
+                  <a:srgbClr val="000000"/>
+                </a:solidFill>
+                <a:latin typeface="Arial"/>
+              </a:rPr>
+              <a:t>&lt;number&gt;</a:t>
+            </a:fld>
+            <a:endParaRPr b="0" lang="en-US" sz="1200" spc="-1" strike="noStrike">
+              <a:latin typeface="Nimbus Sans"/>
+            </a:endParaRPr>
+          </a:p>
+        </p:txBody>
+      </p:sp>
+      <p:sp>
+        <p:nvSpPr>
+          <p:cNvPr id="152" name="CustomShape 2"/>
           <p:cNvSpPr/>
           <p:nvPr/>
         </p:nvSpPr>
@@ -7594,7 +7897,7 @@
       </p:sp>
       <p:sp>
         <p:nvSpPr>
-          <p:cNvPr id="149" name="CustomShape 3"/>
+          <p:cNvPr id="153" name="CustomShape 3"/>
           <p:cNvSpPr/>
           <p:nvPr/>
         </p:nvSpPr>

</xml_diff>